<commit_message>
included Qian's part in pptx
</commit_message>
<xml_diff>
--- a/presentation/easy move_DF.pptx
+++ b/presentation/easy move_DF.pptx
@@ -5,7 +5,7 @@
     <p:sldMasterId id="2147483684" r:id="rId1"/>
   </p:sldMasterIdLst>
   <p:notesMasterIdLst>
-    <p:notesMasterId r:id="rId8"/>
+    <p:notesMasterId r:id="rId12"/>
   </p:notesMasterIdLst>
   <p:sldIdLst>
     <p:sldId id="274" r:id="rId2"/>
@@ -14,6 +14,10 @@
     <p:sldId id="285" r:id="rId5"/>
     <p:sldId id="286" r:id="rId6"/>
     <p:sldId id="289" r:id="rId7"/>
+    <p:sldId id="290" r:id="rId8"/>
+    <p:sldId id="291" r:id="rId9"/>
+    <p:sldId id="292" r:id="rId10"/>
+    <p:sldId id="293" r:id="rId11"/>
   </p:sldIdLst>
   <p:sldSz cx="12192000" cy="6858000"/>
   <p:notesSz cx="7315200" cy="9601200"/>
@@ -4774,6 +4778,198 @@
 </p:sld>
 </file>
 
+<file path=ppt/slides/slide10.xml><?xml version="1.0" encoding="utf-8"?>
+<p:sld xmlns:a="http://schemas.openxmlformats.org/drawingml/2006/main" xmlns:r="http://schemas.openxmlformats.org/officeDocument/2006/relationships" xmlns:p="http://schemas.openxmlformats.org/presentationml/2006/main">
+  <p:cSld>
+    <p:spTree>
+      <p:nvGrpSpPr>
+        <p:cNvPr id="1" name=""/>
+        <p:cNvGrpSpPr/>
+        <p:nvPr/>
+      </p:nvGrpSpPr>
+      <p:grpSpPr>
+        <a:xfrm>
+          <a:off x="0" y="0"/>
+          <a:ext cx="0" cy="0"/>
+          <a:chOff x="0" y="0"/>
+          <a:chExt cx="0" cy="0"/>
+        </a:xfrm>
+      </p:grpSpPr>
+      <p:sp>
+        <p:nvSpPr>
+          <p:cNvPr id="2" name="Title 1">
+            <a:extLst>
+              <a:ext uri="{FF2B5EF4-FFF2-40B4-BE49-F238E27FC236}">
+                <a16:creationId xmlns:a16="http://schemas.microsoft.com/office/drawing/2014/main" id="{4403C6B6-B2AA-4A89-B3E7-30BBA31CFAA7}"/>
+              </a:ext>
+            </a:extLst>
+          </p:cNvPr>
+          <p:cNvSpPr>
+            <a:spLocks noGrp="1"/>
+          </p:cNvSpPr>
+          <p:nvPr>
+            <p:ph type="title"/>
+          </p:nvPr>
+        </p:nvSpPr>
+        <p:spPr>
+          <a:xfrm>
+            <a:off x="609600" y="704088"/>
+            <a:ext cx="10972800" cy="879783"/>
+          </a:xfrm>
+        </p:spPr>
+        <p:txBody>
+          <a:bodyPr/>
+          <a:lstStyle/>
+          <a:p>
+            <a:r>
+              <a:rPr lang="en-CA" dirty="0"/>
+              <a:t>summary</a:t>
+            </a:r>
+          </a:p>
+        </p:txBody>
+      </p:sp>
+      <p:sp>
+        <p:nvSpPr>
+          <p:cNvPr id="3" name="Content Placeholder 2">
+            <a:extLst>
+              <a:ext uri="{FF2B5EF4-FFF2-40B4-BE49-F238E27FC236}">
+                <a16:creationId xmlns:a16="http://schemas.microsoft.com/office/drawing/2014/main" id="{CCE81885-54BA-480B-92B2-78F51DA5305C}"/>
+              </a:ext>
+            </a:extLst>
+          </p:cNvPr>
+          <p:cNvSpPr>
+            <a:spLocks noGrp="1"/>
+          </p:cNvSpPr>
+          <p:nvPr>
+            <p:ph idx="1"/>
+          </p:nvPr>
+        </p:nvSpPr>
+        <p:spPr/>
+        <p:txBody>
+          <a:bodyPr/>
+          <a:lstStyle/>
+          <a:p>
+            <a:r>
+              <a:rPr lang="en-CA" dirty="0"/>
+              <a:t>Combined several technologies to realize this project:</a:t>
+            </a:r>
+          </a:p>
+          <a:p>
+            <a:pPr marL="0" indent="0">
+              <a:buNone/>
+            </a:pPr>
+            <a:r>
+              <a:rPr lang="en-CA" dirty="0"/>
+              <a:t>	</a:t>
+            </a:r>
+            <a:r>
+              <a:rPr lang="en-CA" dirty="0" err="1"/>
+              <a:t>Mysql</a:t>
+            </a:r>
+            <a:r>
+              <a:rPr lang="en-CA" dirty="0"/>
+              <a:t> </a:t>
+            </a:r>
+            <a:r>
+              <a:rPr lang="en-CA" dirty="0" err="1"/>
+              <a:t>databse</a:t>
+            </a:r>
+            <a:r>
+              <a:rPr lang="en-CA" dirty="0"/>
+              <a:t>, </a:t>
+            </a:r>
+            <a:r>
+              <a:rPr lang="en-CA" dirty="0" err="1"/>
+              <a:t>php</a:t>
+            </a:r>
+            <a:r>
+              <a:rPr lang="en-CA" dirty="0"/>
+              <a:t>, </a:t>
+            </a:r>
+            <a:r>
+              <a:rPr lang="en-CA" dirty="0" err="1"/>
+              <a:t>css</a:t>
+            </a:r>
+            <a:r>
+              <a:rPr lang="en-CA" dirty="0"/>
+              <a:t>, </a:t>
+            </a:r>
+            <a:r>
+              <a:rPr lang="en-CA" dirty="0" err="1"/>
+              <a:t>javascript</a:t>
+            </a:r>
+            <a:r>
+              <a:rPr lang="en-CA" dirty="0"/>
+              <a:t>, </a:t>
+            </a:r>
+            <a:r>
+              <a:rPr lang="en-CA" dirty="0" err="1"/>
+              <a:t>jquery</a:t>
+            </a:r>
+            <a:r>
+              <a:rPr lang="en-CA" dirty="0"/>
+              <a:t>, angular, html, 	bootstrap, </a:t>
+            </a:r>
+            <a:r>
+              <a:rPr lang="en-CA" dirty="0" err="1"/>
+              <a:t>fullcalendar</a:t>
+            </a:r>
+            <a:r>
+              <a:rPr lang="en-CA" dirty="0"/>
+              <a:t> plugin, desktop application(C#)</a:t>
+            </a:r>
+          </a:p>
+          <a:p>
+            <a:pPr marL="0" indent="0">
+              <a:buNone/>
+            </a:pPr>
+            <a:endParaRPr lang="en-CA" dirty="0"/>
+          </a:p>
+          <a:p>
+            <a:r>
+              <a:rPr lang="en-CA" dirty="0"/>
+              <a:t>Through this project, finally obtained a clearer idea from the front end to back end  and connected some dots.</a:t>
+            </a:r>
+          </a:p>
+          <a:p>
+            <a:endParaRPr lang="en-CA" dirty="0"/>
+          </a:p>
+          <a:p>
+            <a:pPr marL="0" indent="0">
+              <a:buNone/>
+            </a:pPr>
+            <a:endParaRPr lang="en-CA" dirty="0"/>
+          </a:p>
+          <a:p>
+            <a:endParaRPr lang="en-CA" dirty="0"/>
+          </a:p>
+        </p:txBody>
+      </p:sp>
+    </p:spTree>
+    <p:extLst>
+      <p:ext uri="{BB962C8B-B14F-4D97-AF65-F5344CB8AC3E}">
+        <p14:creationId xmlns:p14="http://schemas.microsoft.com/office/powerpoint/2010/main" val="136917715"/>
+      </p:ext>
+    </p:extLst>
+  </p:cSld>
+  <p:clrMapOvr>
+    <a:masterClrMapping/>
+  </p:clrMapOvr>
+  <mc:AlternateContent xmlns:mc="http://schemas.openxmlformats.org/markup-compatibility/2006" xmlns:p14="http://schemas.microsoft.com/office/powerpoint/2010/main">
+    <mc:Choice Requires="p14">
+      <p:transition spd="med" p14:dur="700">
+        <p:fade/>
+      </p:transition>
+    </mc:Choice>
+    <mc:Fallback xmlns="">
+      <p:transition spd="med">
+        <p:fade/>
+      </p:transition>
+    </mc:Fallback>
+  </mc:AlternateContent>
+</p:sld>
+</file>
+
 <file path=ppt/slides/slide2.xml><?xml version="1.0" encoding="utf-8"?>
 <p:sld xmlns:a="http://schemas.openxmlformats.org/drawingml/2006/main" xmlns:r="http://schemas.openxmlformats.org/officeDocument/2006/relationships" xmlns:p="http://schemas.openxmlformats.org/presentationml/2006/main">
   <p:cSld>
@@ -5046,7 +5242,7 @@
           <a:p>
             <a:r>
               <a:rPr lang="en-CA" dirty="0"/>
-              <a:t>Save to database – error checking</a:t>
+              <a:t>Save to database  and error checking</a:t>
             </a:r>
           </a:p>
         </p:txBody>
@@ -5159,7 +5355,7 @@
             </a:r>
             <a:r>
               <a:rPr lang="en-US" sz="2200" dirty="0"/>
-              <a:t>We have a dynamic calendar which fetches the data from database and display the unavailable dates on the calendar.</a:t>
+              <a:t>a dynamic calendar which fetches the data from database and display the unavailable dates on the calendar.</a:t>
             </a:r>
             <a:br>
               <a:rPr lang="en-US" sz="2200" dirty="0"/>
@@ -5486,6 +5682,463 @@
     <p:extLst>
       <p:ext uri="{BB962C8B-B14F-4D97-AF65-F5344CB8AC3E}">
         <p14:creationId xmlns:p14="http://schemas.microsoft.com/office/powerpoint/2010/main" val="1060824984"/>
+      </p:ext>
+    </p:extLst>
+  </p:cSld>
+  <p:clrMapOvr>
+    <a:masterClrMapping/>
+  </p:clrMapOvr>
+  <mc:AlternateContent xmlns:mc="http://schemas.openxmlformats.org/markup-compatibility/2006" xmlns:p14="http://schemas.microsoft.com/office/powerpoint/2010/main">
+    <mc:Choice Requires="p14">
+      <p:transition spd="med" p14:dur="700">
+        <p:fade/>
+      </p:transition>
+    </mc:Choice>
+    <mc:Fallback xmlns="">
+      <p:transition spd="med">
+        <p:fade/>
+      </p:transition>
+    </mc:Fallback>
+  </mc:AlternateContent>
+</p:sld>
+</file>
+
+<file path=ppt/slides/slide7.xml><?xml version="1.0" encoding="utf-8"?>
+<p:sld xmlns:a="http://schemas.openxmlformats.org/drawingml/2006/main" xmlns:r="http://schemas.openxmlformats.org/officeDocument/2006/relationships" xmlns:p="http://schemas.openxmlformats.org/presentationml/2006/main">
+  <p:cSld>
+    <p:spTree>
+      <p:nvGrpSpPr>
+        <p:cNvPr id="1" name=""/>
+        <p:cNvGrpSpPr/>
+        <p:nvPr/>
+      </p:nvGrpSpPr>
+      <p:grpSpPr>
+        <a:xfrm>
+          <a:off x="0" y="0"/>
+          <a:ext cx="0" cy="0"/>
+          <a:chOff x="0" y="0"/>
+          <a:chExt cx="0" cy="0"/>
+        </a:xfrm>
+      </p:grpSpPr>
+      <p:sp>
+        <p:nvSpPr>
+          <p:cNvPr id="2" name="Title 1">
+            <a:extLst>
+              <a:ext uri="{FF2B5EF4-FFF2-40B4-BE49-F238E27FC236}">
+                <a16:creationId xmlns:a16="http://schemas.microsoft.com/office/drawing/2014/main" id="{889A0CDF-78D7-421A-B6C2-F41127E5EF63}"/>
+              </a:ext>
+            </a:extLst>
+          </p:cNvPr>
+          <p:cNvSpPr>
+            <a:spLocks noGrp="1"/>
+          </p:cNvSpPr>
+          <p:nvPr>
+            <p:ph type="title"/>
+          </p:nvPr>
+        </p:nvSpPr>
+        <p:spPr>
+          <a:xfrm>
+            <a:off x="609600" y="704088"/>
+            <a:ext cx="10972800" cy="602198"/>
+          </a:xfrm>
+        </p:spPr>
+        <p:txBody>
+          <a:bodyPr>
+            <a:normAutofit fontScale="90000"/>
+          </a:bodyPr>
+          <a:lstStyle/>
+          <a:p>
+            <a:r>
+              <a:rPr lang="en-CA" dirty="0"/>
+              <a:t>Contact form</a:t>
+            </a:r>
+          </a:p>
+        </p:txBody>
+      </p:sp>
+      <p:pic>
+        <p:nvPicPr>
+          <p:cNvPr id="4" name="Content Placeholder 3">
+            <a:extLst>
+              <a:ext uri="{FF2B5EF4-FFF2-40B4-BE49-F238E27FC236}">
+                <a16:creationId xmlns:a16="http://schemas.microsoft.com/office/drawing/2014/main" id="{24702E2B-E6CC-4A7B-84CA-A152FE69F380}"/>
+              </a:ext>
+            </a:extLst>
+          </p:cNvPr>
+          <p:cNvPicPr>
+            <a:picLocks noGrp="1" noChangeAspect="1"/>
+          </p:cNvPicPr>
+          <p:nvPr>
+            <p:ph idx="1"/>
+          </p:nvPr>
+        </p:nvPicPr>
+        <p:blipFill>
+          <a:blip r:embed="rId2"/>
+          <a:stretch>
+            <a:fillRect/>
+          </a:stretch>
+        </p:blipFill>
+        <p:spPr>
+          <a:xfrm>
+            <a:off x="2465615" y="1371601"/>
+            <a:ext cx="5995307" cy="4364583"/>
+          </a:xfrm>
+          <a:prstGeom prst="rect">
+            <a:avLst/>
+          </a:prstGeom>
+        </p:spPr>
+      </p:pic>
+    </p:spTree>
+    <p:extLst>
+      <p:ext uri="{BB962C8B-B14F-4D97-AF65-F5344CB8AC3E}">
+        <p14:creationId xmlns:p14="http://schemas.microsoft.com/office/powerpoint/2010/main" val="2354324279"/>
+      </p:ext>
+    </p:extLst>
+  </p:cSld>
+  <p:clrMapOvr>
+    <a:masterClrMapping/>
+  </p:clrMapOvr>
+  <mc:AlternateContent xmlns:mc="http://schemas.openxmlformats.org/markup-compatibility/2006" xmlns:p14="http://schemas.microsoft.com/office/powerpoint/2010/main">
+    <mc:Choice Requires="p14">
+      <p:transition spd="med" p14:dur="700">
+        <p:fade/>
+      </p:transition>
+    </mc:Choice>
+    <mc:Fallback xmlns="">
+      <p:transition spd="med">
+        <p:fade/>
+      </p:transition>
+    </mc:Fallback>
+  </mc:AlternateContent>
+</p:sld>
+</file>
+
+<file path=ppt/slides/slide8.xml><?xml version="1.0" encoding="utf-8"?>
+<p:sld xmlns:a="http://schemas.openxmlformats.org/drawingml/2006/main" xmlns:r="http://schemas.openxmlformats.org/officeDocument/2006/relationships" xmlns:p="http://schemas.openxmlformats.org/presentationml/2006/main">
+  <p:cSld>
+    <p:spTree>
+      <p:nvGrpSpPr>
+        <p:cNvPr id="1" name=""/>
+        <p:cNvGrpSpPr/>
+        <p:nvPr/>
+      </p:nvGrpSpPr>
+      <p:grpSpPr>
+        <a:xfrm>
+          <a:off x="0" y="0"/>
+          <a:ext cx="0" cy="0"/>
+          <a:chOff x="0" y="0"/>
+          <a:chExt cx="0" cy="0"/>
+        </a:xfrm>
+      </p:grpSpPr>
+      <p:sp>
+        <p:nvSpPr>
+          <p:cNvPr id="2" name="Title 1">
+            <a:extLst>
+              <a:ext uri="{FF2B5EF4-FFF2-40B4-BE49-F238E27FC236}">
+                <a16:creationId xmlns:a16="http://schemas.microsoft.com/office/drawing/2014/main" id="{FA20CB5D-5060-4A8E-B688-868265FF16E7}"/>
+              </a:ext>
+            </a:extLst>
+          </p:cNvPr>
+          <p:cNvSpPr>
+            <a:spLocks noGrp="1"/>
+          </p:cNvSpPr>
+          <p:nvPr>
+            <p:ph type="title"/>
+          </p:nvPr>
+        </p:nvSpPr>
+        <p:spPr>
+          <a:xfrm>
+            <a:off x="609600" y="704088"/>
+            <a:ext cx="10972800" cy="553212"/>
+          </a:xfrm>
+        </p:spPr>
+        <p:txBody>
+          <a:bodyPr>
+            <a:normAutofit fontScale="90000"/>
+          </a:bodyPr>
+          <a:lstStyle/>
+          <a:p>
+            <a:r>
+              <a:rPr lang="en-CA" dirty="0"/>
+              <a:t>Contact form - – validation by angular</a:t>
+            </a:r>
+          </a:p>
+        </p:txBody>
+      </p:sp>
+      <p:sp>
+        <p:nvSpPr>
+          <p:cNvPr id="3" name="Content Placeholder 2">
+            <a:extLst>
+              <a:ext uri="{FF2B5EF4-FFF2-40B4-BE49-F238E27FC236}">
+                <a16:creationId xmlns:a16="http://schemas.microsoft.com/office/drawing/2014/main" id="{DF011551-3269-4588-8FBA-62D2AAC2D43E}"/>
+              </a:ext>
+            </a:extLst>
+          </p:cNvPr>
+          <p:cNvSpPr>
+            <a:spLocks noGrp="1"/>
+          </p:cNvSpPr>
+          <p:nvPr>
+            <p:ph idx="1"/>
+          </p:nvPr>
+        </p:nvSpPr>
+        <p:spPr>
+          <a:xfrm>
+            <a:off x="609600" y="1257300"/>
+            <a:ext cx="10972800" cy="5067300"/>
+          </a:xfrm>
+        </p:spPr>
+        <p:txBody>
+          <a:bodyPr/>
+          <a:lstStyle/>
+          <a:p>
+            <a:r>
+              <a:rPr lang="en-CA" dirty="0"/>
+              <a:t>Html mark up</a:t>
+            </a:r>
+          </a:p>
+          <a:p>
+            <a:endParaRPr lang="en-CA" dirty="0"/>
+          </a:p>
+          <a:p>
+            <a:endParaRPr lang="en-CA" dirty="0"/>
+          </a:p>
+          <a:p>
+            <a:pPr marL="0" indent="0">
+              <a:buNone/>
+            </a:pPr>
+            <a:r>
+              <a:rPr lang="en-CA" dirty="0"/>
+              <a:t>Script with angular</a:t>
+            </a:r>
+          </a:p>
+          <a:p>
+            <a:pPr marL="0" indent="0">
+              <a:buNone/>
+            </a:pPr>
+            <a:endParaRPr lang="en-CA" dirty="0"/>
+          </a:p>
+          <a:p>
+            <a:endParaRPr lang="en-CA" dirty="0"/>
+          </a:p>
+        </p:txBody>
+      </p:sp>
+      <p:pic>
+        <p:nvPicPr>
+          <p:cNvPr id="4" name="Picture 3">
+            <a:extLst>
+              <a:ext uri="{FF2B5EF4-FFF2-40B4-BE49-F238E27FC236}">
+                <a16:creationId xmlns:a16="http://schemas.microsoft.com/office/drawing/2014/main" id="{8BB5D3FC-F0E8-4921-BAF0-E65B7A391828}"/>
+              </a:ext>
+            </a:extLst>
+          </p:cNvPr>
+          <p:cNvPicPr>
+            <a:picLocks noChangeAspect="1"/>
+          </p:cNvPicPr>
+          <p:nvPr/>
+        </p:nvPicPr>
+        <p:blipFill>
+          <a:blip r:embed="rId2"/>
+          <a:stretch>
+            <a:fillRect/>
+          </a:stretch>
+        </p:blipFill>
+        <p:spPr>
+          <a:xfrm>
+            <a:off x="518522" y="1810512"/>
+            <a:ext cx="11063878" cy="736745"/>
+          </a:xfrm>
+          <a:prstGeom prst="rect">
+            <a:avLst/>
+          </a:prstGeom>
+        </p:spPr>
+      </p:pic>
+      <p:pic>
+        <p:nvPicPr>
+          <p:cNvPr id="5" name="Picture 4">
+            <a:extLst>
+              <a:ext uri="{FF2B5EF4-FFF2-40B4-BE49-F238E27FC236}">
+                <a16:creationId xmlns:a16="http://schemas.microsoft.com/office/drawing/2014/main" id="{8004637E-B15D-4412-BBE1-E399C6109CD7}"/>
+              </a:ext>
+            </a:extLst>
+          </p:cNvPr>
+          <p:cNvPicPr>
+            <a:picLocks noChangeAspect="1"/>
+          </p:cNvPicPr>
+          <p:nvPr/>
+        </p:nvPicPr>
+        <p:blipFill>
+          <a:blip r:embed="rId3"/>
+          <a:stretch>
+            <a:fillRect/>
+          </a:stretch>
+        </p:blipFill>
+        <p:spPr>
+          <a:xfrm>
+            <a:off x="518522" y="3388178"/>
+            <a:ext cx="10675489" cy="1804308"/>
+          </a:xfrm>
+          <a:prstGeom prst="rect">
+            <a:avLst/>
+          </a:prstGeom>
+        </p:spPr>
+      </p:pic>
+    </p:spTree>
+    <p:extLst>
+      <p:ext uri="{BB962C8B-B14F-4D97-AF65-F5344CB8AC3E}">
+        <p14:creationId xmlns:p14="http://schemas.microsoft.com/office/powerpoint/2010/main" val="740495698"/>
+      </p:ext>
+    </p:extLst>
+  </p:cSld>
+  <p:clrMapOvr>
+    <a:masterClrMapping/>
+  </p:clrMapOvr>
+  <mc:AlternateContent xmlns:mc="http://schemas.openxmlformats.org/markup-compatibility/2006" xmlns:p14="http://schemas.microsoft.com/office/powerpoint/2010/main">
+    <mc:Choice Requires="p14">
+      <p:transition spd="med" p14:dur="700">
+        <p:fade/>
+      </p:transition>
+    </mc:Choice>
+    <mc:Fallback xmlns="">
+      <p:transition spd="med">
+        <p:fade/>
+      </p:transition>
+    </mc:Fallback>
+  </mc:AlternateContent>
+</p:sld>
+</file>
+
+<file path=ppt/slides/slide9.xml><?xml version="1.0" encoding="utf-8"?>
+<p:sld xmlns:a="http://schemas.openxmlformats.org/drawingml/2006/main" xmlns:r="http://schemas.openxmlformats.org/officeDocument/2006/relationships" xmlns:p="http://schemas.openxmlformats.org/presentationml/2006/main">
+  <p:cSld>
+    <p:spTree>
+      <p:nvGrpSpPr>
+        <p:cNvPr id="1" name=""/>
+        <p:cNvGrpSpPr/>
+        <p:nvPr/>
+      </p:nvGrpSpPr>
+      <p:grpSpPr>
+        <a:xfrm>
+          <a:off x="0" y="0"/>
+          <a:ext cx="0" cy="0"/>
+          <a:chOff x="0" y="0"/>
+          <a:chExt cx="0" cy="0"/>
+        </a:xfrm>
+      </p:grpSpPr>
+      <p:sp>
+        <p:nvSpPr>
+          <p:cNvPr id="2" name="Title 1">
+            <a:extLst>
+              <a:ext uri="{FF2B5EF4-FFF2-40B4-BE49-F238E27FC236}">
+                <a16:creationId xmlns:a16="http://schemas.microsoft.com/office/drawing/2014/main" id="{A10C38A8-447D-4DBA-946B-ADB41B2DE67E}"/>
+              </a:ext>
+            </a:extLst>
+          </p:cNvPr>
+          <p:cNvSpPr>
+            <a:spLocks noGrp="1"/>
+          </p:cNvSpPr>
+          <p:nvPr>
+            <p:ph type="title"/>
+          </p:nvPr>
+        </p:nvSpPr>
+        <p:spPr>
+          <a:xfrm>
+            <a:off x="609600" y="704088"/>
+            <a:ext cx="10972800" cy="667512"/>
+          </a:xfrm>
+        </p:spPr>
+        <p:txBody>
+          <a:bodyPr>
+            <a:normAutofit fontScale="90000"/>
+          </a:bodyPr>
+          <a:lstStyle/>
+          <a:p>
+            <a:r>
+              <a:rPr lang="en-CA" dirty="0"/>
+              <a:t>Future improvements</a:t>
+            </a:r>
+          </a:p>
+        </p:txBody>
+      </p:sp>
+      <p:sp>
+        <p:nvSpPr>
+          <p:cNvPr id="3" name="Content Placeholder 2">
+            <a:extLst>
+              <a:ext uri="{FF2B5EF4-FFF2-40B4-BE49-F238E27FC236}">
+                <a16:creationId xmlns:a16="http://schemas.microsoft.com/office/drawing/2014/main" id="{D569DBFD-BBC7-45F7-B0F2-77F64C685C73}"/>
+              </a:ext>
+            </a:extLst>
+          </p:cNvPr>
+          <p:cNvSpPr>
+            <a:spLocks noGrp="1"/>
+          </p:cNvSpPr>
+          <p:nvPr>
+            <p:ph idx="1"/>
+          </p:nvPr>
+        </p:nvSpPr>
+        <p:spPr>
+          <a:xfrm>
+            <a:off x="609600" y="1534886"/>
+            <a:ext cx="10972800" cy="4789714"/>
+          </a:xfrm>
+        </p:spPr>
+        <p:txBody>
+          <a:bodyPr/>
+          <a:lstStyle/>
+          <a:p>
+            <a:r>
+              <a:rPr lang="en-CA" dirty="0"/>
+              <a:t>Complete all the web-pages French and English.</a:t>
+            </a:r>
+          </a:p>
+          <a:p>
+            <a:r>
+              <a:rPr lang="en-CA" dirty="0"/>
+              <a:t>Enable user to schedule a moving appointment.</a:t>
+            </a:r>
+          </a:p>
+          <a:p>
+            <a:r>
+              <a:rPr lang="en-CA" dirty="0"/>
+              <a:t>When an estimation request was submitted, user will get an email.</a:t>
+            </a:r>
+          </a:p>
+          <a:p>
+            <a:r>
+              <a:rPr lang="en-CA" dirty="0"/>
+              <a:t>Implement site security control : when form is being submitted, there need to be matched token from session and from the form hidden input tag of the form.</a:t>
+            </a:r>
+          </a:p>
+          <a:p>
+            <a:r>
+              <a:rPr lang="en-CA" dirty="0"/>
+              <a:t>Write an .</a:t>
+            </a:r>
+            <a:r>
+              <a:rPr lang="en-CA" dirty="0" err="1"/>
+              <a:t>htaccess</a:t>
+            </a:r>
+            <a:r>
+              <a:rPr lang="en-CA" dirty="0"/>
+              <a:t> to prohibit unauthorized access to internal files.</a:t>
+            </a:r>
+          </a:p>
+          <a:p>
+            <a:r>
+              <a:rPr lang="en-CA" dirty="0"/>
+              <a:t>Implement Admin pages to manager trucks, estimations, orders, prices, etc.</a:t>
+            </a:r>
+          </a:p>
+          <a:p>
+            <a:endParaRPr lang="en-CA" dirty="0"/>
+          </a:p>
+          <a:p>
+            <a:endParaRPr lang="en-CA" dirty="0"/>
+          </a:p>
+        </p:txBody>
+      </p:sp>
+    </p:spTree>
+    <p:extLst>
+      <p:ext uri="{BB962C8B-B14F-4D97-AF65-F5344CB8AC3E}">
+        <p14:creationId xmlns:p14="http://schemas.microsoft.com/office/powerpoint/2010/main" val="3565010939"/>
       </p:ext>
     </p:extLst>
   </p:cSld>

</xml_diff>

<commit_message>
* web site last version (ARCHIVE) + presentation
</commit_message>
<xml_diff>
--- a/presentation/easy move_DF.pptx
+++ b/presentation/easy move_DF.pptx
@@ -206,7 +206,7 @@
           <a:p>
             <a:fld id="{71BD4573-58E7-4156-A133-2731F5F8D1A6}" type="datetimeFigureOut">
               <a:rPr lang="en-US" smtClean="0"/>
-              <a:t>4/30/2018</a:t>
+              <a:t>2018-04-30</a:t>
             </a:fld>
             <a:endParaRPr lang="en-US"/>
           </a:p>
@@ -787,7 +787,7 @@
           <a:p>
             <a:fld id="{021A1D30-C0A0-4124-A783-34D9F15FA0FE}" type="datetime1">
               <a:rPr lang="en-US" smtClean="0"/>
-              <a:t>4/30/2018</a:t>
+              <a:t>2018-04-30</a:t>
             </a:fld>
             <a:endParaRPr lang="en-US"/>
           </a:p>
@@ -971,7 +971,7 @@
           <a:p>
             <a:fld id="{8D2D5871-AB0F-4B3D-8861-97E78CB7B47E}" type="datetime1">
               <a:rPr lang="en-US" smtClean="0"/>
-              <a:t>4/30/2018</a:t>
+              <a:t>2018-04-30</a:t>
             </a:fld>
             <a:endParaRPr lang="en-US"/>
           </a:p>
@@ -1165,7 +1165,7 @@
           <a:p>
             <a:fld id="{14418406-4C3F-4F3E-80BD-A22568EA37EB}" type="datetime1">
               <a:rPr lang="en-US" smtClean="0"/>
-              <a:t>4/30/2018</a:t>
+              <a:t>2018-04-30</a:t>
             </a:fld>
             <a:endParaRPr lang="en-US"/>
           </a:p>
@@ -1349,7 +1349,7 @@
           <a:p>
             <a:fld id="{65F28077-7188-48C5-8679-2287FAC952E9}" type="datetime1">
               <a:rPr lang="en-US" smtClean="0"/>
-              <a:t>4/30/2018</a:t>
+              <a:t>2018-04-30</a:t>
             </a:fld>
             <a:endParaRPr lang="en-US"/>
           </a:p>
@@ -1596,7 +1596,7 @@
           <a:p>
             <a:fld id="{D2DCB740-6776-4EE9-99FD-96D592FA5A23}" type="datetime1">
               <a:rPr lang="en-US" smtClean="0"/>
-              <a:t>4/30/2018</a:t>
+              <a:t>2018-04-30</a:t>
             </a:fld>
             <a:endParaRPr lang="en-US"/>
           </a:p>
@@ -1879,7 +1879,7 @@
           <a:p>
             <a:fld id="{05F6BD99-6FFD-46C5-B5E2-43A34BDA2566}" type="datetime1">
               <a:rPr lang="en-US" smtClean="0"/>
-              <a:t>4/30/2018</a:t>
+              <a:t>2018-04-30</a:t>
             </a:fld>
             <a:endParaRPr lang="en-US"/>
           </a:p>
@@ -2276,7 +2276,7 @@
           <a:p>
             <a:fld id="{E022678E-214C-4CF8-97C7-95015FB02960}" type="datetime1">
               <a:rPr lang="en-US" smtClean="0"/>
-              <a:t>4/30/2018</a:t>
+              <a:t>2018-04-30</a:t>
             </a:fld>
             <a:endParaRPr lang="en-US"/>
           </a:p>
@@ -2445,7 +2445,7 @@
           <a:p>
             <a:fld id="{D55660E0-FA77-4473-A859-74127B089143}" type="datetime1">
               <a:rPr lang="en-US" smtClean="0"/>
-              <a:t>4/30/2018</a:t>
+              <a:t>2018-04-30</a:t>
             </a:fld>
             <a:endParaRPr lang="en-US"/>
           </a:p>
@@ -2555,7 +2555,7 @@
           <a:p>
             <a:fld id="{3188D7B8-9F07-4899-827D-5F3CFDDEB574}" type="datetime1">
               <a:rPr lang="en-US" smtClean="0"/>
-              <a:t>4/30/2018</a:t>
+              <a:t>2018-04-30</a:t>
             </a:fld>
             <a:endParaRPr lang="en-US"/>
           </a:p>
@@ -2835,7 +2835,7 @@
           <a:p>
             <a:fld id="{B5197C5C-1CD1-417D-A89C-14747F5222C7}" type="datetime1">
               <a:rPr lang="en-US" smtClean="0"/>
-              <a:t>4/30/2018</a:t>
+              <a:t>2018-04-30</a:t>
             </a:fld>
             <a:endParaRPr lang="en-US"/>
           </a:p>
@@ -3188,7 +3188,7 @@
           <a:p>
             <a:fld id="{1359EFBB-CFA1-4AA8-9123-F0B52DBD84FE}" type="datetime1">
               <a:rPr lang="en-US" smtClean="0"/>
-              <a:t>4/30/2018</a:t>
+              <a:t>2018-04-30</a:t>
             </a:fld>
             <a:endParaRPr lang="en-US"/>
           </a:p>
@@ -4222,7 +4222,7 @@
             <a:fld id="{61146459-E3C3-4969-9224-5ED50B492D17}" type="datetime1">
               <a:rPr lang="en-US" smtClean="0"/>
               <a:pPr/>
-              <a:t>4/30/2018</a:t>
+              <a:t>2018-04-30</a:t>
             </a:fld>
             <a:endParaRPr lang="en-US" dirty="0"/>
           </a:p>
@@ -4670,21 +4670,21 @@
         </p:nvSpPr>
         <p:spPr>
           <a:xfrm>
-            <a:off x="609600" y="704088"/>
+            <a:off x="657225" y="925152"/>
             <a:ext cx="10972800" cy="700642"/>
           </a:xfrm>
         </p:spPr>
         <p:txBody>
           <a:bodyPr>
-            <a:normAutofit fontScale="90000"/>
+            <a:normAutofit/>
           </a:bodyPr>
           <a:lstStyle/>
           <a:p>
             <a:r>
-              <a:rPr lang="en-CA" dirty="0"/>
-              <a:t>Estimation form-processing</a:t>
-            </a:r>
-            <a:endParaRPr lang="en-US" dirty="0"/>
+              <a:rPr lang="en-CA" sz="4000" b="1" dirty="0" smtClean="0"/>
+              <a:t>Estimation request – form processing</a:t>
+            </a:r>
+            <a:endParaRPr lang="en-US" sz="4000" b="1" dirty="0"/>
           </a:p>
         </p:txBody>
       </p:sp>
@@ -4737,16 +4737,15 @@
           </p:cNvPicPr>
           <p:nvPr/>
         </p:nvPicPr>
-        <p:blipFill>
+        <p:blipFill rotWithShape="1">
           <a:blip r:embed="rId2"/>
-          <a:stretch>
-            <a:fillRect/>
-          </a:stretch>
+          <a:srcRect b="4211"/>
+          <a:stretch/>
         </p:blipFill>
         <p:spPr>
           <a:xfrm>
-            <a:off x="336688" y="1404730"/>
-            <a:ext cx="11020425" cy="4775130"/>
+            <a:off x="657225" y="1917196"/>
+            <a:ext cx="11020425" cy="4574039"/>
           </a:xfrm>
           <a:prstGeom prst="rect">
             <a:avLst/>
@@ -4813,18 +4812,25 @@
         </p:nvSpPr>
         <p:spPr>
           <a:xfrm>
-            <a:off x="609600" y="704088"/>
+            <a:off x="981389" y="784475"/>
             <a:ext cx="10972800" cy="879783"/>
           </a:xfrm>
         </p:spPr>
         <p:txBody>
-          <a:bodyPr/>
+          <a:bodyPr>
+            <a:normAutofit/>
+          </a:bodyPr>
           <a:lstStyle/>
           <a:p>
             <a:r>
-              <a:rPr lang="en-CA" dirty="0"/>
-              <a:t>summary</a:t>
-            </a:r>
+              <a:rPr lang="en-CA" sz="4000" b="1" dirty="0"/>
+              <a:t>S</a:t>
+            </a:r>
+            <a:r>
+              <a:rPr lang="en-CA" sz="4000" b="1" dirty="0" smtClean="0"/>
+              <a:t>ummary</a:t>
+            </a:r>
+            <a:endParaRPr lang="en-CA" sz="4000" b="1" dirty="0"/>
           </a:p>
         </p:txBody>
       </p:sp>
@@ -4844,7 +4850,12 @@
             <p:ph idx="1"/>
           </p:nvPr>
         </p:nvSpPr>
-        <p:spPr/>
+        <p:spPr>
+          <a:xfrm>
+            <a:off x="609600" y="1935480"/>
+            <a:ext cx="10972800" cy="3691597"/>
+          </a:xfrm>
+        </p:spPr>
         <p:txBody>
           <a:bodyPr/>
           <a:lstStyle/>
@@ -4863,60 +4874,76 @@
               <a:t>	</a:t>
             </a:r>
             <a:r>
-              <a:rPr lang="en-CA" dirty="0" err="1"/>
-              <a:t>Mysql</a:t>
-            </a:r>
-            <a:r>
-              <a:rPr lang="en-CA" dirty="0"/>
-              <a:t> </a:t>
-            </a:r>
-            <a:r>
-              <a:rPr lang="en-CA" dirty="0" err="1"/>
-              <a:t>databse</a:t>
+              <a:rPr lang="en-CA" dirty="0" smtClean="0"/>
+              <a:t>MySQL </a:t>
+            </a:r>
+            <a:r>
+              <a:rPr lang="en-CA" dirty="0" err="1" smtClean="0"/>
+              <a:t>Databse</a:t>
             </a:r>
             <a:r>
               <a:rPr lang="en-CA" dirty="0"/>
               <a:t>, </a:t>
             </a:r>
             <a:r>
-              <a:rPr lang="en-CA" dirty="0" err="1"/>
-              <a:t>php</a:t>
+              <a:rPr lang="en-CA" dirty="0" smtClean="0"/>
+              <a:t>PHP, CSS, </a:t>
+            </a:r>
+            <a:r>
+              <a:rPr lang="en-CA" dirty="0" smtClean="0"/>
+              <a:t>J</a:t>
+            </a:r>
+            <a:r>
+              <a:rPr lang="en-CA" dirty="0" smtClean="0"/>
+              <a:t>avaScript</a:t>
             </a:r>
             <a:r>
               <a:rPr lang="en-CA" dirty="0"/>
               <a:t>, </a:t>
             </a:r>
             <a:r>
-              <a:rPr lang="en-CA" dirty="0" err="1"/>
-              <a:t>css</a:t>
+              <a:rPr lang="en-CA" dirty="0" smtClean="0"/>
+              <a:t>JQuery</a:t>
             </a:r>
             <a:r>
               <a:rPr lang="en-CA" dirty="0"/>
               <a:t>, </a:t>
             </a:r>
             <a:r>
-              <a:rPr lang="en-CA" dirty="0" err="1"/>
-              <a:t>javascript</a:t>
+              <a:rPr lang="en-CA" dirty="0" smtClean="0"/>
+              <a:t>Angular</a:t>
             </a:r>
             <a:r>
               <a:rPr lang="en-CA" dirty="0"/>
               <a:t>, </a:t>
             </a:r>
             <a:r>
-              <a:rPr lang="en-CA" dirty="0" err="1"/>
-              <a:t>jquery</a:t>
+              <a:rPr lang="en-CA" dirty="0" smtClean="0"/>
+              <a:t>HTML, </a:t>
             </a:r>
             <a:r>
               <a:rPr lang="en-CA" dirty="0"/>
-              <a:t>, angular, html, 	bootstrap, </a:t>
-            </a:r>
-            <a:r>
-              <a:rPr lang="en-CA" dirty="0" err="1"/>
-              <a:t>fullcalendar</a:t>
+              <a:t>	</a:t>
+            </a:r>
+            <a:r>
+              <a:rPr lang="en-CA" dirty="0" smtClean="0"/>
+              <a:t>Bootstrap</a:t>
             </a:r>
             <a:r>
               <a:rPr lang="en-CA" dirty="0"/>
-              <a:t> plugin, desktop application(C#)</a:t>
+              <a:t>, </a:t>
+            </a:r>
+            <a:r>
+              <a:rPr lang="en-CA" dirty="0" err="1" smtClean="0"/>
+              <a:t>Fullcalendar</a:t>
+            </a:r>
+            <a:r>
+              <a:rPr lang="en-CA" dirty="0" smtClean="0"/>
+              <a:t> </a:t>
+            </a:r>
+            <a:r>
+              <a:rPr lang="en-CA" dirty="0"/>
+              <a:t>plugin, desktop application(C#)</a:t>
             </a:r>
           </a:p>
           <a:p>
@@ -4928,8 +4955,21 @@
           <a:p>
             <a:r>
               <a:rPr lang="en-CA" dirty="0"/>
-              <a:t>Through this project, finally obtained a clearer idea from the front end to back end  and connected some dots.</a:t>
-            </a:r>
+              <a:t>Through this project, finally obtained a clearer idea from the front end to back end </a:t>
+            </a:r>
+            <a:r>
+              <a:rPr lang="en-CA" dirty="0" smtClean="0"/>
+              <a:t>and </a:t>
+            </a:r>
+            <a:r>
+              <a:rPr lang="en-CA" dirty="0"/>
+              <a:t>connected some </a:t>
+            </a:r>
+            <a:r>
+              <a:rPr lang="en-CA" dirty="0" smtClean="0"/>
+              <a:t>dots</a:t>
+            </a:r>
+            <a:endParaRPr lang="en-CA" dirty="0"/>
           </a:p>
           <a:p>
             <a:endParaRPr lang="en-CA" dirty="0"/>
@@ -5005,19 +5045,35 @@
         </p:nvSpPr>
         <p:spPr>
           <a:xfrm>
-            <a:off x="609600" y="399288"/>
+            <a:off x="1112018" y="795998"/>
             <a:ext cx="10972800" cy="700642"/>
           </a:xfrm>
         </p:spPr>
         <p:txBody>
           <a:bodyPr>
-            <a:normAutofit fontScale="90000"/>
+            <a:normAutofit/>
           </a:bodyPr>
           <a:lstStyle/>
           <a:p>
             <a:r>
-              <a:rPr lang="en-CA" dirty="0"/>
-              <a:t>Form validation-client side  / server side</a:t>
+              <a:rPr lang="en-CA" sz="4000" b="1" dirty="0"/>
+              <a:t>Form </a:t>
+            </a:r>
+            <a:r>
+              <a:rPr lang="en-CA" sz="4000" b="1" dirty="0" smtClean="0"/>
+              <a:t>validation - client </a:t>
+            </a:r>
+            <a:r>
+              <a:rPr lang="en-CA" sz="4000" b="1" dirty="0"/>
+              <a:t>side </a:t>
+            </a:r>
+            <a:r>
+              <a:rPr lang="en-CA" sz="4000" b="1" dirty="0" smtClean="0"/>
+              <a:t>/ </a:t>
+            </a:r>
+            <a:r>
+              <a:rPr lang="en-CA" sz="4000" b="1" dirty="0"/>
+              <a:t>server side</a:t>
             </a:r>
           </a:p>
         </p:txBody>
@@ -5046,7 +5102,7 @@
         </p:blipFill>
         <p:spPr>
           <a:xfrm>
-            <a:off x="347178" y="1026083"/>
+            <a:off x="609600" y="1763659"/>
             <a:ext cx="5346050" cy="2326413"/>
           </a:xfrm>
           <a:prstGeom prst="rect">
@@ -5076,7 +5132,7 @@
         </p:blipFill>
         <p:spPr>
           <a:xfrm>
-            <a:off x="5960283" y="1118139"/>
+            <a:off x="6307016" y="1763659"/>
             <a:ext cx="5114512" cy="2115621"/>
           </a:xfrm>
           <a:prstGeom prst="rect">
@@ -5098,8 +5154,8 @@
         </p:nvSpPr>
         <p:spPr>
           <a:xfrm>
-            <a:off x="347178" y="3517626"/>
-            <a:ext cx="10167257" cy="923330"/>
+            <a:off x="609600" y="4223582"/>
+            <a:ext cx="10167257" cy="646331"/>
           </a:xfrm>
           <a:prstGeom prst="rect">
             <a:avLst/>
@@ -5122,20 +5178,17 @@
               <a:t>If there are data to be corrected, whatever user entered will stay, so user just need to correct fields where need to be corrected. To do this, have add below </a:t>
             </a:r>
             <a:r>
-              <a:rPr lang="en-CA" dirty="0" err="1"/>
-              <a:t>php</a:t>
+              <a:rPr lang="en-CA" dirty="0" smtClean="0"/>
+              <a:t>PHP </a:t>
             </a:r>
             <a:r>
               <a:rPr lang="en-CA" dirty="0"/>
-              <a:t> code into html </a:t>
-            </a:r>
-            <a:r>
-              <a:rPr lang="en-CA" dirty="0" err="1"/>
-              <a:t>tage</a:t>
-            </a:r>
-            <a:endParaRPr lang="en-CA" dirty="0"/>
-          </a:p>
-          <a:p>
+              <a:t>code into </a:t>
+            </a:r>
+            <a:r>
+              <a:rPr lang="en-CA" dirty="0" smtClean="0"/>
+              <a:t>HTML tag</a:t>
+            </a:r>
             <a:endParaRPr lang="en-CA" dirty="0"/>
           </a:p>
         </p:txBody>
@@ -5162,8 +5215,8 @@
         </p:blipFill>
         <p:spPr>
           <a:xfrm>
-            <a:off x="347178" y="4440956"/>
-            <a:ext cx="6662639" cy="1812887"/>
+            <a:off x="887932" y="5136932"/>
+            <a:ext cx="6002215" cy="1504657"/>
           </a:xfrm>
           <a:prstGeom prst="rect">
             <a:avLst/>
@@ -5230,20 +5283,29 @@
         </p:nvSpPr>
         <p:spPr>
           <a:xfrm>
-            <a:off x="609600" y="704088"/>
-            <a:ext cx="10972800" cy="660886"/>
+            <a:off x="1582142" y="784475"/>
+            <a:ext cx="9762447" cy="660886"/>
           </a:xfrm>
         </p:spPr>
         <p:txBody>
           <a:bodyPr>
-            <a:normAutofit fontScale="90000"/>
+            <a:normAutofit/>
           </a:bodyPr>
           <a:lstStyle/>
           <a:p>
             <a:r>
-              <a:rPr lang="en-CA" dirty="0"/>
-              <a:t>Save to database  and error checking</a:t>
-            </a:r>
+              <a:rPr lang="en-CA" sz="4000" b="1" dirty="0" smtClean="0"/>
+              <a:t>Saving into </a:t>
+            </a:r>
+            <a:r>
+              <a:rPr lang="en-CA" sz="4000" b="1" dirty="0"/>
+              <a:t>database </a:t>
+            </a:r>
+            <a:r>
+              <a:rPr lang="en-CA" sz="4000" b="1" dirty="0" smtClean="0"/>
+              <a:t>and validations</a:t>
+            </a:r>
+            <a:endParaRPr lang="en-CA" sz="4000" b="1" dirty="0"/>
           </a:p>
         </p:txBody>
       </p:sp>
@@ -5263,16 +5325,15 @@
             <p:ph idx="1"/>
           </p:nvPr>
         </p:nvPicPr>
-        <p:blipFill>
+        <p:blipFill rotWithShape="1">
           <a:blip r:embed="rId2"/>
-          <a:stretch>
-            <a:fillRect/>
-          </a:stretch>
+          <a:srcRect t="1242"/>
+          <a:stretch/>
         </p:blipFill>
         <p:spPr>
           <a:xfrm>
-            <a:off x="1511804" y="1365250"/>
-            <a:ext cx="9168392" cy="4959350"/>
+            <a:off x="1582142" y="1788606"/>
+            <a:ext cx="9168392" cy="4897733"/>
           </a:xfrm>
           <a:prstGeom prst="rect">
             <a:avLst/>
@@ -5339,8 +5400,8 @@
         </p:nvSpPr>
         <p:spPr>
           <a:xfrm>
-            <a:off x="609600" y="344558"/>
-            <a:ext cx="10972800" cy="1391478"/>
+            <a:off x="1122069" y="633047"/>
+            <a:ext cx="6122794" cy="4252162"/>
           </a:xfrm>
         </p:spPr>
         <p:txBody>
@@ -5349,18 +5410,84 @@
           </a:bodyPr>
           <a:lstStyle/>
           <a:p>
-            <a:r>
-              <a:rPr lang="en-CA" dirty="0"/>
-              <a:t>calendar	- </a:t>
-            </a:r>
-            <a:r>
-              <a:rPr lang="en-US" sz="2200" dirty="0"/>
-              <a:t>a dynamic calendar which fetches the data from database and display the unavailable dates on the calendar.</a:t>
+            <a:pPr>
+              <a:lnSpc>
+                <a:spcPct val="150000"/>
+              </a:lnSpc>
+              <a:spcBef>
+                <a:spcPts val="600"/>
+              </a:spcBef>
+              <a:spcAft>
+                <a:spcPts val="600"/>
+              </a:spcAft>
+            </a:pPr>
+            <a:r>
+              <a:rPr lang="en-US" sz="4000" b="1" dirty="0" smtClean="0"/>
+              <a:t>Dynamic </a:t>
+            </a:r>
+            <a:r>
+              <a:rPr lang="en-US" sz="4000" b="1" dirty="0"/>
+              <a:t>calendar </a:t>
+            </a:r>
+            <a:r>
+              <a:rPr lang="en-US" sz="1400" dirty="0" smtClean="0"/>
+              <a:t/>
             </a:r>
             <a:br>
-              <a:rPr lang="en-US" sz="2200" dirty="0"/>
+              <a:rPr lang="en-US" sz="1400" dirty="0" smtClean="0"/>
             </a:br>
-            <a:endParaRPr lang="en-US" sz="2200" dirty="0"/>
+            <a:r>
+              <a:rPr lang="en-US" sz="1400" dirty="0" smtClean="0"/>
+              <a:t/>
+            </a:r>
+            <a:br>
+              <a:rPr lang="en-US" sz="1400" dirty="0" smtClean="0"/>
+            </a:br>
+            <a:r>
+              <a:rPr lang="en-US" sz="3100" dirty="0" smtClean="0"/>
+              <a:t>fetching </a:t>
+            </a:r>
+            <a:r>
+              <a:rPr lang="en-US" sz="3100" dirty="0"/>
+              <a:t>the data </a:t>
+            </a:r>
+            <a:r>
+              <a:rPr lang="en-US" sz="3100" dirty="0" smtClean="0"/>
+              <a:t/>
+            </a:r>
+            <a:br>
+              <a:rPr lang="en-US" sz="3100" dirty="0" smtClean="0"/>
+            </a:br>
+            <a:r>
+              <a:rPr lang="en-US" sz="3100" dirty="0" smtClean="0"/>
+              <a:t>from database</a:t>
+            </a:r>
+            <a:br>
+              <a:rPr lang="en-US" sz="3100" dirty="0" smtClean="0"/>
+            </a:br>
+            <a:r>
+              <a:rPr lang="en-US" sz="3100" dirty="0" smtClean="0"/>
+              <a:t>and displaying </a:t>
+            </a:r>
+            <a:br>
+              <a:rPr lang="en-US" sz="3100" dirty="0" smtClean="0"/>
+            </a:br>
+            <a:r>
+              <a:rPr lang="en-US" sz="3100" dirty="0" smtClean="0"/>
+              <a:t>the </a:t>
+            </a:r>
+            <a:r>
+              <a:rPr lang="en-US" sz="3100" dirty="0"/>
+              <a:t>unavailable dates </a:t>
+            </a:r>
+            <a:r>
+              <a:rPr lang="en-US" sz="2700" dirty="0" smtClean="0"/>
+              <a:t/>
+            </a:r>
+            <a:br>
+              <a:rPr lang="en-US" sz="2700" dirty="0" smtClean="0"/>
+            </a:br>
+            <a:endParaRPr lang="en-US" sz="2700" dirty="0"/>
           </a:p>
         </p:txBody>
       </p:sp>
@@ -5388,7 +5515,7 @@
         </p:blipFill>
         <p:spPr>
           <a:xfrm>
-            <a:off x="3111212" y="1616075"/>
+            <a:off x="5442428" y="1666317"/>
             <a:ext cx="5969575" cy="4708525"/>
           </a:xfrm>
           <a:prstGeom prst="rect">
@@ -5456,28 +5583,33 @@
         </p:nvSpPr>
         <p:spPr>
           <a:xfrm>
-            <a:off x="609600" y="346279"/>
+            <a:off x="1051727" y="708019"/>
             <a:ext cx="10972800" cy="766903"/>
           </a:xfrm>
         </p:spPr>
         <p:txBody>
           <a:bodyPr>
-            <a:normAutofit fontScale="90000"/>
+            <a:normAutofit/>
           </a:bodyPr>
           <a:lstStyle/>
           <a:p>
             <a:r>
-              <a:rPr lang="en-US" dirty="0"/>
+              <a:rPr lang="en-US" sz="4000" b="1" dirty="0"/>
               <a:t>Calendar – used </a:t>
             </a:r>
             <a:r>
-              <a:rPr lang="en-US" dirty="0" err="1"/>
-              <a:t>fullcalendar</a:t>
-            </a:r>
-            <a:r>
-              <a:rPr lang="en-US" dirty="0"/>
-              <a:t> plug in</a:t>
-            </a:r>
+              <a:rPr lang="en-US" sz="4000" b="1" dirty="0" err="1"/>
+              <a:t>F</a:t>
+            </a:r>
+            <a:r>
+              <a:rPr lang="en-US" sz="4000" b="1" dirty="0" err="1" smtClean="0"/>
+              <a:t>ullcalendar</a:t>
+            </a:r>
+            <a:r>
+              <a:rPr lang="en-US" sz="4000" b="1" dirty="0" smtClean="0"/>
+              <a:t> plugin</a:t>
+            </a:r>
+            <a:endParaRPr lang="en-US" sz="4000" b="1" dirty="0"/>
           </a:p>
         </p:txBody>
       </p:sp>
@@ -5505,8 +5637,8 @@
         </p:blipFill>
         <p:spPr>
           <a:xfrm>
-            <a:off x="739727" y="1285461"/>
-            <a:ext cx="10791056" cy="5009322"/>
+            <a:off x="958662" y="1788607"/>
+            <a:ext cx="10616318" cy="4928207"/>
           </a:xfrm>
           <a:prstGeom prst="rect">
             <a:avLst/>
@@ -5573,7 +5705,7 @@
         </p:nvSpPr>
         <p:spPr>
           <a:xfrm>
-            <a:off x="609600" y="704088"/>
+            <a:off x="1463710" y="744472"/>
             <a:ext cx="10972800" cy="753651"/>
           </a:xfrm>
         </p:spPr>
@@ -5584,9 +5716,14 @@
           <a:lstStyle/>
           <a:p>
             <a:r>
-              <a:rPr lang="en-CA" dirty="0"/>
-              <a:t>calendar</a:t>
-            </a:r>
+              <a:rPr lang="en-CA" b="1" dirty="0"/>
+              <a:t>C</a:t>
+            </a:r>
+            <a:r>
+              <a:rPr lang="en-CA" b="1" dirty="0" smtClean="0"/>
+              <a:t>alendar</a:t>
+            </a:r>
+            <a:endParaRPr lang="en-CA" b="1" dirty="0"/>
           </a:p>
         </p:txBody>
       </p:sp>
@@ -5608,8 +5745,8 @@
         </p:nvSpPr>
         <p:spPr>
           <a:xfrm>
-            <a:off x="609600" y="1550504"/>
-            <a:ext cx="10972800" cy="4774096"/>
+            <a:off x="1343128" y="1595479"/>
+            <a:ext cx="10544071" cy="4774096"/>
           </a:xfrm>
         </p:spPr>
         <p:txBody>
@@ -5621,21 +5758,18 @@
               <a:t>How to pass data fetched from database by </a:t>
             </a:r>
             <a:r>
-              <a:rPr lang="en-CA" dirty="0" err="1"/>
-              <a:t>php</a:t>
+              <a:rPr lang="en-CA" dirty="0" smtClean="0"/>
+              <a:t>PHP </a:t>
             </a:r>
             <a:r>
               <a:rPr lang="en-CA" dirty="0"/>
-              <a:t> to </a:t>
-            </a:r>
-            <a:r>
-              <a:rPr lang="en-CA" dirty="0" err="1"/>
-              <a:t>Jquery</a:t>
-            </a:r>
-            <a:r>
-              <a:rPr lang="en-CA" dirty="0"/>
-              <a:t> script ?</a:t>
-            </a:r>
+              <a:t>to </a:t>
+            </a:r>
+            <a:r>
+              <a:rPr lang="en-CA" dirty="0" smtClean="0"/>
+              <a:t>JQuery script?</a:t>
+            </a:r>
+            <a:endParaRPr lang="en-CA" dirty="0"/>
           </a:p>
           <a:p>
             <a:r>
@@ -5670,7 +5804,7 @@
         </p:blipFill>
         <p:spPr>
           <a:xfrm>
-            <a:off x="4395787" y="2276474"/>
+            <a:off x="5470961" y="2154418"/>
             <a:ext cx="6038170" cy="4093101"/>
           </a:xfrm>
           <a:prstGeom prst="rect">
@@ -5738,18 +5872,18 @@
         </p:nvSpPr>
         <p:spPr>
           <a:xfrm>
-            <a:off x="609600" y="704088"/>
+            <a:off x="1996273" y="769403"/>
             <a:ext cx="10972800" cy="602198"/>
           </a:xfrm>
         </p:spPr>
         <p:txBody>
           <a:bodyPr>
-            <a:normAutofit fontScale="90000"/>
+            <a:noAutofit/>
           </a:bodyPr>
           <a:lstStyle/>
           <a:p>
             <a:r>
-              <a:rPr lang="en-CA" dirty="0"/>
+              <a:rPr lang="en-CA" sz="4000" b="1" dirty="0"/>
               <a:t>Contact form</a:t>
             </a:r>
           </a:p>
@@ -5779,7 +5913,7 @@
         </p:blipFill>
         <p:spPr>
           <a:xfrm>
-            <a:off x="2465615" y="1371601"/>
+            <a:off x="2676630" y="1803680"/>
             <a:ext cx="5995307" cy="4364583"/>
           </a:xfrm>
           <a:prstGeom prst="rect">
@@ -5847,20 +5981,33 @@
         </p:nvSpPr>
         <p:spPr>
           <a:xfrm>
-            <a:off x="609600" y="704088"/>
+            <a:off x="655139" y="1058358"/>
             <a:ext cx="10972800" cy="553212"/>
           </a:xfrm>
         </p:spPr>
         <p:txBody>
           <a:bodyPr>
-            <a:normAutofit fontScale="90000"/>
+            <a:noAutofit/>
           </a:bodyPr>
           <a:lstStyle/>
           <a:p>
             <a:r>
-              <a:rPr lang="en-CA" dirty="0"/>
-              <a:t>Contact form - – validation by angular</a:t>
-            </a:r>
+              <a:rPr lang="en-CA" sz="4000" b="1" dirty="0"/>
+              <a:t>Contact form </a:t>
+            </a:r>
+            <a:r>
+              <a:rPr lang="en-CA" sz="4000" b="1" dirty="0" smtClean="0"/>
+              <a:t>– </a:t>
+            </a:r>
+            <a:r>
+              <a:rPr lang="en-CA" sz="4000" b="1" dirty="0"/>
+              <a:t>validation by </a:t>
+            </a:r>
+            <a:r>
+              <a:rPr lang="en-CA" sz="4000" b="1" dirty="0" smtClean="0"/>
+              <a:t>Angular</a:t>
+            </a:r>
+            <a:endParaRPr lang="en-CA" sz="4000" b="1" dirty="0"/>
           </a:p>
         </p:txBody>
       </p:sp>
@@ -5882,7 +6029,7 @@
         </p:nvSpPr>
         <p:spPr>
           <a:xfrm>
-            <a:off x="609600" y="1257300"/>
+            <a:off x="483032" y="1950637"/>
             <a:ext cx="10972800" cy="5067300"/>
           </a:xfrm>
         </p:spPr>
@@ -5891,8 +6038,12 @@
           <a:lstStyle/>
           <a:p>
             <a:r>
+              <a:rPr lang="en-CA" dirty="0" smtClean="0"/>
+              <a:t>HTML </a:t>
+            </a:r>
+            <a:r>
               <a:rPr lang="en-CA" dirty="0"/>
-              <a:t>Html mark up</a:t>
+              <a:t>mark up</a:t>
             </a:r>
           </a:p>
           <a:p>
@@ -5907,8 +6058,13 @@
             </a:pPr>
             <a:r>
               <a:rPr lang="en-CA" dirty="0"/>
-              <a:t>Script with angular</a:t>
-            </a:r>
+              <a:t>Script with </a:t>
+            </a:r>
+            <a:r>
+              <a:rPr lang="en-CA" dirty="0" smtClean="0"/>
+              <a:t>Angular</a:t>
+            </a:r>
+            <a:endParaRPr lang="en-CA" dirty="0"/>
           </a:p>
           <a:p>
             <a:pPr marL="0" indent="0">
@@ -5943,7 +6099,7 @@
         </p:blipFill>
         <p:spPr>
           <a:xfrm>
-            <a:off x="518522" y="1810512"/>
+            <a:off x="564061" y="2527369"/>
             <a:ext cx="11063878" cy="736745"/>
           </a:xfrm>
           <a:prstGeom prst="rect">
@@ -5973,7 +6129,7 @@
         </p:blipFill>
         <p:spPr>
           <a:xfrm>
-            <a:off x="518522" y="3388178"/>
+            <a:off x="483032" y="4021224"/>
             <a:ext cx="10675489" cy="1804308"/>
           </a:xfrm>
           <a:prstGeom prst="rect">
@@ -6041,18 +6197,18 @@
         </p:nvSpPr>
         <p:spPr>
           <a:xfrm>
-            <a:off x="609600" y="704088"/>
+            <a:off x="609600" y="1065830"/>
             <a:ext cx="10972800" cy="667512"/>
           </a:xfrm>
         </p:spPr>
         <p:txBody>
           <a:bodyPr>
-            <a:normAutofit fontScale="90000"/>
+            <a:normAutofit/>
           </a:bodyPr>
           <a:lstStyle/>
           <a:p>
             <a:r>
-              <a:rPr lang="en-CA" dirty="0"/>
+              <a:rPr lang="en-CA" sz="4000" b="1" dirty="0"/>
               <a:t>Future improvements</a:t>
             </a:r>
           </a:p>
@@ -6076,54 +6232,120 @@
         </p:nvSpPr>
         <p:spPr>
           <a:xfrm>
-            <a:off x="609600" y="1534886"/>
-            <a:ext cx="10972800" cy="4789714"/>
+            <a:off x="609600" y="2117691"/>
+            <a:ext cx="11267552" cy="4373545"/>
           </a:xfrm>
         </p:spPr>
         <p:txBody>
           <a:bodyPr/>
           <a:lstStyle/>
           <a:p>
-            <a:r>
-              <a:rPr lang="en-CA" dirty="0"/>
-              <a:t>Complete all the web-pages French and English.</a:t>
-            </a:r>
-          </a:p>
-          <a:p>
-            <a:r>
-              <a:rPr lang="en-CA" dirty="0"/>
-              <a:t>Enable user to schedule a moving appointment.</a:t>
-            </a:r>
-          </a:p>
-          <a:p>
-            <a:r>
-              <a:rPr lang="en-CA" dirty="0"/>
-              <a:t>When an estimation request was submitted, user will get an email.</a:t>
-            </a:r>
-          </a:p>
-          <a:p>
-            <a:r>
-              <a:rPr lang="en-CA" dirty="0"/>
-              <a:t>Implement site security control : when form is being submitted, there need to be matched token from session and from the form hidden input tag of the form.</a:t>
-            </a:r>
-          </a:p>
-          <a:p>
-            <a:r>
-              <a:rPr lang="en-CA" dirty="0"/>
+            <a:pPr>
+              <a:spcAft>
+                <a:spcPts val="1200"/>
+              </a:spcAft>
+            </a:pPr>
+            <a:r>
+              <a:rPr lang="en-CA" sz="2500" dirty="0"/>
+              <a:t>Complete all the web-pages French and </a:t>
+            </a:r>
+            <a:r>
+              <a:rPr lang="en-CA" sz="2500" dirty="0" smtClean="0"/>
+              <a:t>English</a:t>
+            </a:r>
+            <a:endParaRPr lang="en-CA" sz="2500" dirty="0"/>
+          </a:p>
+          <a:p>
+            <a:pPr>
+              <a:spcAft>
+                <a:spcPts val="1200"/>
+              </a:spcAft>
+            </a:pPr>
+            <a:r>
+              <a:rPr lang="en-CA" sz="2500" dirty="0"/>
+              <a:t>Enable user to schedule a moving </a:t>
+            </a:r>
+            <a:r>
+              <a:rPr lang="en-CA" sz="2500" dirty="0" smtClean="0"/>
+              <a:t>appointment</a:t>
+            </a:r>
+            <a:endParaRPr lang="en-CA" sz="2500" dirty="0"/>
+          </a:p>
+          <a:p>
+            <a:pPr>
+              <a:spcAft>
+                <a:spcPts val="1200"/>
+              </a:spcAft>
+            </a:pPr>
+            <a:r>
+              <a:rPr lang="en-CA" sz="2500" dirty="0"/>
+              <a:t>When an estimation request was submitted, user will get an </a:t>
+            </a:r>
+            <a:r>
+              <a:rPr lang="en-CA" sz="2500" dirty="0" smtClean="0"/>
+              <a:t>email</a:t>
+            </a:r>
+            <a:endParaRPr lang="en-CA" sz="2500" dirty="0"/>
+          </a:p>
+          <a:p>
+            <a:pPr>
+              <a:spcAft>
+                <a:spcPts val="1200"/>
+              </a:spcAft>
+            </a:pPr>
+            <a:r>
+              <a:rPr lang="en-CA" sz="2500" dirty="0"/>
+              <a:t>Implement site security </a:t>
+            </a:r>
+            <a:r>
+              <a:rPr lang="en-CA" sz="2500" dirty="0" smtClean="0"/>
+              <a:t>control: </a:t>
+            </a:r>
+            <a:r>
+              <a:rPr lang="en-CA" sz="2500" dirty="0"/>
+              <a:t>when form is </a:t>
+            </a:r>
+            <a:r>
+              <a:rPr lang="en-CA" sz="2500" dirty="0" smtClean="0"/>
+              <a:t>submitted</a:t>
+            </a:r>
+            <a:r>
+              <a:rPr lang="en-CA" sz="2500" dirty="0"/>
+              <a:t>, there need to be matched token from session and from the form hidden input tag of the </a:t>
+            </a:r>
+            <a:r>
+              <a:rPr lang="en-CA" sz="2500" dirty="0" smtClean="0"/>
+              <a:t>form</a:t>
+            </a:r>
+            <a:endParaRPr lang="en-CA" sz="2500" dirty="0"/>
+          </a:p>
+          <a:p>
+            <a:pPr>
+              <a:spcAft>
+                <a:spcPts val="1200"/>
+              </a:spcAft>
+            </a:pPr>
+            <a:r>
+              <a:rPr lang="en-CA" sz="2500" dirty="0"/>
               <a:t>Write an .</a:t>
             </a:r>
             <a:r>
-              <a:rPr lang="en-CA" dirty="0" err="1"/>
+              <a:rPr lang="en-CA" sz="2500" dirty="0" err="1"/>
               <a:t>htaccess</a:t>
             </a:r>
             <a:r>
-              <a:rPr lang="en-CA" dirty="0"/>
+              <a:rPr lang="en-CA" sz="2500" dirty="0"/>
               <a:t> to prohibit unauthorized access to internal files.</a:t>
             </a:r>
           </a:p>
           <a:p>
-            <a:r>
-              <a:rPr lang="en-CA" dirty="0"/>
+            <a:pPr>
+              <a:spcAft>
+                <a:spcPts val="1200"/>
+              </a:spcAft>
+            </a:pPr>
+            <a:r>
+              <a:rPr lang="en-CA" sz="2500" dirty="0"/>
               <a:t>Implement Admin pages to manager trucks, estimations, orders, prices, etc.</a:t>
             </a:r>
           </a:p>

</xml_diff>